<commit_message>
HTML Practice 2. gün
</commit_message>
<xml_diff>
--- a/04-HTML/Practise/practice-html.pptx
+++ b/04-HTML/Practise/practice-html.pptx
@@ -280,7 +280,7 @@
       <p15:sldGuideLst xmlns:p15="http://schemas.microsoft.com/office/powerpoint/2012/main"/>
     </p:ext>
     <p:ext uri="http://customooxmlschemas.google.com/">
-      <go:slidesCustomData xmlns="" xmlns:mc="http://schemas.openxmlformats.org/markup-compatibility/2006" xmlns:mv="urn:schemas-microsoft-com:mac:vml" xmlns:c="http://schemas.openxmlformats.org/drawingml/2006/chart" xmlns:dgm="http://schemas.openxmlformats.org/drawingml/2006/diagram" xmlns:o="urn:schemas-microsoft-com:office:office" xmlns:v="urn:schemas-microsoft-com:vml" xmlns:pvml="urn:schemas-microsoft-com:office:powerpoint" xmlns:com="http://schemas.openxmlformats.org/drawingml/2006/compatibility" xmlns:p14="http://schemas.microsoft.com/office/powerpoint/2010/main" xmlns:p15="http://schemas.microsoft.com/office/powerpoint/2012/main" xmlns:ahyp="http://schemas.microsoft.com/office/drawing/2018/hyperlinkcolor" xmlns:go="http://customooxmlschemas.google.com/" r:id="rId30" roundtripDataSignature="AMtx7mjYGb7t75l2dMy0HGoTbwHPt4DyoA=="/>
+      <go:slidesCustomData xmlns:go="http://customooxmlschemas.google.com/" xmlns:ahyp="http://schemas.microsoft.com/office/drawing/2018/hyperlinkcolor" xmlns:p15="http://schemas.microsoft.com/office/powerpoint/2012/main" xmlns:p14="http://schemas.microsoft.com/office/powerpoint/2010/main" xmlns:com="http://schemas.openxmlformats.org/drawingml/2006/compatibility" xmlns:pvml="urn:schemas-microsoft-com:office:powerpoint" xmlns:v="urn:schemas-microsoft-com:vml" xmlns:o="urn:schemas-microsoft-com:office:office" xmlns:dgm="http://schemas.openxmlformats.org/drawingml/2006/diagram" xmlns:c="http://schemas.openxmlformats.org/drawingml/2006/chart" xmlns:mv="urn:schemas-microsoft-com:mac:vml" xmlns:mc="http://schemas.openxmlformats.org/markup-compatibility/2006" xmlns="" r:id="rId30" roundtripDataSignature="AMtx7mjYGb7t75l2dMy0HGoTbwHPt4DyoA=="/>
     </p:ext>
   </p:extLst>
 </p:presentation>
@@ -16583,36 +16583,6 @@
       </p:sp>
       <p:pic>
         <p:nvPicPr>
-          <p:cNvPr id="5" name="Resim 4">
-            <a:extLst>
-              <a:ext uri="{FF2B5EF4-FFF2-40B4-BE49-F238E27FC236}">
-                <a16:creationId xmlns:a16="http://schemas.microsoft.com/office/drawing/2014/main" id="{AC48EBC7-00EA-ABCE-C5FD-BAE31C40C4EF}"/>
-              </a:ext>
-            </a:extLst>
-          </p:cNvPr>
-          <p:cNvPicPr>
-            <a:picLocks noChangeAspect="1"/>
-          </p:cNvPicPr>
-          <p:nvPr/>
-        </p:nvPicPr>
-        <p:blipFill>
-          <a:blip r:embed="rId2"/>
-          <a:stretch>
-            <a:fillRect/>
-          </a:stretch>
-        </p:blipFill>
-        <p:spPr>
-          <a:xfrm>
-            <a:off x="1540151" y="1150040"/>
-            <a:ext cx="3943350" cy="4336360"/>
-          </a:xfrm>
-          <a:prstGeom prst="rect">
-            <a:avLst/>
-          </a:prstGeom>
-        </p:spPr>
-      </p:pic>
-      <p:pic>
-        <p:nvPicPr>
           <p:cNvPr id="7" name="Resim 6">
             <a:extLst>
               <a:ext uri="{FF2B5EF4-FFF2-40B4-BE49-F238E27FC236}">
@@ -16626,7 +16596,7 @@
           <p:nvPr/>
         </p:nvPicPr>
         <p:blipFill>
-          <a:blip r:embed="rId3"/>
+          <a:blip r:embed="rId2"/>
           <a:stretch>
             <a:fillRect/>
           </a:stretch>
@@ -16708,6 +16678,36 @@
           </a:p>
         </p:txBody>
       </p:sp>
+      <p:pic>
+        <p:nvPicPr>
+          <p:cNvPr id="4" name="Resim 3">
+            <a:extLst>
+              <a:ext uri="{FF2B5EF4-FFF2-40B4-BE49-F238E27FC236}">
+                <a16:creationId xmlns:a16="http://schemas.microsoft.com/office/drawing/2014/main" id="{FE3EED7E-C494-6F5B-ADB4-030AA183F3B7}"/>
+              </a:ext>
+            </a:extLst>
+          </p:cNvPr>
+          <p:cNvPicPr>
+            <a:picLocks noChangeAspect="1"/>
+          </p:cNvPicPr>
+          <p:nvPr/>
+        </p:nvPicPr>
+        <p:blipFill>
+          <a:blip r:embed="rId3"/>
+          <a:stretch>
+            <a:fillRect/>
+          </a:stretch>
+        </p:blipFill>
+        <p:spPr>
+          <a:xfrm>
+            <a:off x="1566655" y="1527910"/>
+            <a:ext cx="3600450" cy="3800475"/>
+          </a:xfrm>
+          <a:prstGeom prst="rect">
+            <a:avLst/>
+          </a:prstGeom>
+        </p:spPr>
+      </p:pic>
     </p:spTree>
     <p:extLst>
       <p:ext uri="{BB962C8B-B14F-4D97-AF65-F5344CB8AC3E}">

</xml_diff>